<commit_message>
Se espacia el barrido del logo cada 10 pixeles
</commit_message>
<xml_diff>
--- a/Flujograma.pptx
+++ b/Flujograma.pptx
@@ -110,7 +110,49 @@
       </a:defRPr>
     </a:lvl9pPr>
   </p:defaultTextStyle>
+  <p:extLst>
+    <p:ext uri="{EFAFB233-063F-42B5-8137-9DF3F51BA10A}">
+      <p15:sldGuideLst xmlns:p15="http://schemas.microsoft.com/office/powerpoint/2012/main"/>
+    </p:ext>
+  </p:extLst>
 </p:presentation>
+</file>
+
+<file path=ppt/ink/ink1.xml><?xml version="1.0" encoding="utf-8"?>
+<inkml:ink xmlns:inkml="http://www.w3.org/2003/InkML">
+  <inkml:definitions>
+    <inkml:context xml:id="ctx0">
+      <inkml:inkSource xml:id="inkSrc0">
+        <inkml:traceFormat>
+          <inkml:channel name="X" type="integer" max="1366" units="cm"/>
+          <inkml:channel name="Y" type="integer" max="768" units="cm"/>
+        </inkml:traceFormat>
+        <inkml:channelProperties>
+          <inkml:channelProperty channel="X" name="resolution" value="39.7093" units="1/cm"/>
+          <inkml:channelProperty channel="Y" name="resolution" value="39.79275" units="1/cm"/>
+        </inkml:channelProperties>
+      </inkml:inkSource>
+      <inkml:timestamp xml:id="ts0" timeString="2020-08-21T21:39:31.739"/>
+    </inkml:context>
+    <inkml:brush xml:id="br0">
+      <inkml:brushProperty name="width" value="0.05292" units="cm"/>
+      <inkml:brushProperty name="height" value="0.05292" units="cm"/>
+      <inkml:brushProperty name="color" value="#FF0000"/>
+    </inkml:brush>
+  </inkml:definitions>
+  <inkml:trace contextRef="#ctx0" brushRef="#br0">6576 16993,'0'0,"-65"0,-66 0,66 0,-390 0,324 0,66 0,0 65,0-65,0 65,0-65,0 0,0 65,0-65,0 65,-1-65,66 65,-65 0,-65 1,130 64,-65-65,0 65,0 0,0-65,65 66,-65-66,0 130,-1-130,66 65,-65 1,65-1,0 0,-65 0,65-65,0 66,-65-1,65 0,0-65,0 65,0 1,0-1,0 0,0 0,0-65,0 65,0 1,0-66,0 65,0 0,0 0,65-64,-65-1,0 65,65-65,-65 0,0 65,0-65,65 0,1 66,-66-66,0 0,0 65,65-65,0 0,-65 66,0-1,65 0,0-65,-65 65,65 1,0-66,0 65,-65-65,65 0,0-65,-65 65,66 0,-1-65,-65 65,65-65,65 65,-130 1,130-66,-130 130,130-130,-65 130,1-130,-1 130,0-130,0 65,0 0,0-65,-65 66,65-66,0 0,0 0,-65 65,65-65,1 0,-1 65,0-65,-65 65,65-65,0 0,0 0,0 0,-65 65,65-65,0 0,0 0,1 0,64 0,-65 65,65-65,-65 65,0-65,65 0,-64 65,-1 0,65-65,-65 65,65-65,-65 66,0-66,0 0,1 0,-1 0,0 0,0 0,0 0,65 0,-65 0,0 0,0 0,66 0,-66 0,0 0,0 0,0 0,0 0,65 0,-65 0,66 0,-66 0,0 0,65 0,-65 65,0-65,0 0,66 65,-66-65,0 0,65 0,-65 0,0 0,0 0,0 0,66 0,-66 0,0 0,0 0,0 0,0 0,0 0,0 0,0 0,0-65,1 0,-1 65,65-66,-65 1,0 65,65-65,-65 0,0 65,-65-65,65 65,-65-65,66 0,-1 0,0 65,-65-65,65 0,0-66,65 66,-130 0,130-65,-130 65,131-65,-131 64,130-64,-65 0,65-65,-65 65,0-1,65-64,-64 65,64-66,-130 66,130 65,-65-130,0 130,0 0,-65-66,65 66,0 0,-65-65,66 65,-1-65,-65 65,65-1,-65-64,65 0,-65 65,65-65,-65-1,0 1,65 65,-65-65,0 0,0 0,0-1,0 66,0-65,0 65,65-65,-65 65,0-1,0 1,0 0,0 0,0 0,-65 65,65-65,-65 65,65-65,-65 65,65-65,-65 0,0 65,65-66,-65 66,65-65,-66 65,1-65,0 0,-65 65,65-65,-65-65,0 130,-66-130,66 65,-65-1,65-64,-1 130,-64-65,130 0,0 65,0-65,-65 65,64-65,-64 65,0 0,-65 0,65 0,-1 0,1-65,0 0,65 65,-65 0,65-66,0 66,-1 0,1-65,0 65,0 0,0 0,0-65,0 65,0 0,-131-65,66 65,0 0,-65-65,65 65,-66 0,66 0,0 0,0 0,65 0,-1 0,66-65,-65 65,-65 0,65 0,-65 0,0 0,-1 0,1 0,0 0,0 0,65 0,0 0,0 0,-66-65,66 65,-130-65,130 65,0 0,-65 0,64 0,1 0,0 0,0 0,0 0,0 0,0 0,0 0,0 0,0 0,-1 0,66-65,-65 65,0 0</inkml:trace>
+  <inkml:trace contextRef="#ctx0" brushRef="#br0" timeOffset="98783.3659">29881 15040,'65'0,"1"0,-1 0,0 0,-65-65,65 65,0 0,0 0,-65-66,65 66,0 0,0 0,0 0,-65-65,66 65,-1 0,0 0,0 0,0 0,0 0,0 0,0 0,0 0,0 65,1-65,-1 66,0-66,-65 65,65-65</inkml:trace>
+  <inkml:trace contextRef="#ctx0" brushRef="#br0" timeOffset="100199.9746">29621 16016,'65'0,"-65"-65,130 65,-65 0,-65-65,65 65</inkml:trace>
+  <inkml:trace contextRef="#ctx0" brushRef="#br0" timeOffset="100817.4372">29881 15886,'0'65,"0"65,0-65,0 1,0-1,0 0,0 0,0 0,0 0</inkml:trace>
+  <inkml:trace contextRef="#ctx0" brushRef="#br0" timeOffset="101471.9248">29686 16667,'65'0,"0"0,0 0,0 0,1 0,-1 0,0 0,0 0,0 0,0 0,-65-65</inkml:trace>
+  <inkml:trace contextRef="#ctx0" brushRef="#br0" timeOffset="103128.4096">30337 16602,'0'-65,"0"0,0 0,65 0,-65 0,0 0,65 65,-65-66,65 66,-65-65,65 65,1 0,-66 65,0 1,0-1,0 0,0 0,0 0,65-65,0 0,-65-65,65 0,0 0,0 65,-65 65,65 0,-65 0,0 0,65-65,-65 65,0 0,0 0</inkml:trace>
+  <inkml:trace contextRef="#ctx0" brushRef="#br0" timeOffset="104279.9133">31704 16472,'-65'-65,"0"65,0 0,0 0,0 0,0 0,-1 0,66 65,-65-65,65 65,0 0,0 0,0 0,65 0,1-65,-1 66,0-66,0 0,0 0,0 0,0 0,-65-66,65 66,0 0,-65-65,0 0,0 0,65 65,-65 65,0 0,0 0,0 1,0-1,66 0,-1-65,0 0</inkml:trace>
+  <inkml:trace contextRef="#ctx0" brushRef="#br0" timeOffset="105408.5284">32616 16537,'-66'0,"1"0,0 0,0 0,0 65,65 0,0 0,0 0,0 1,65-66,0 0,0 0,0 0,1-66,-66 1,65 65,-65 65,-65 66,65-66,-66 0,66 0,-65 0,0 0,0 0,-65 0,130 1,-65-66,0 0,0 0,0 0,-1 0,1 0</inkml:trace>
+  <inkml:trace contextRef="#ctx0" brushRef="#br0" timeOffset="106551.7779">33071 16993,'65'0,"-65"-65,65 0,-65-1,66 66,-66-65,65 65,-65-65,0 0,0 0,-65 65,65-65,-66 65,1 0,-65 0,65 0,65 65,-65-65,65 65,-65-65,65 65,0 0,0 0,0 1,0-1,0 65,0-65,65-65,-65 65,65 0,-65 0,65-65,-65 65,65-65,0 0,0 0,1 0,-1 0,-65-65,65 65,-65-65</inkml:trace>
+  <inkml:trace contextRef="#ctx0" brushRef="#br0" timeOffset="107663.6867">33397 16602,'0'65,"0"0,0 0,0 1,0-1,0 0,0 0,0 0,0 0,65-65,-65-65,65 0,-65-65,65-66,0 131,-65-65,0 0,65 0,0 65,-65 130,0 0,0 0,0 65,0-65,0 0,0 0,0 0,0 1,0-1,0 0,0 0</inkml:trace>
+  <inkml:trace contextRef="#ctx0" brushRef="#br0" timeOffset="111153.6421">38800 17383,'65'0,"0"66,0 64,0-65,66 65,-66 65,65 1,65-1,-65 65,1 1,-1 64,0-129,-65 129,65-64,-65-1,66 66,-66-66,0 66,-65-66,0 0,65-64,-65-66,0 0,0 0,0-64,0-1,0 0,0 0,0 0,0 0,-65 0,65 0,0 0,-65 1,0-66,65-66,-66 66,66-65,-65 65,0 0,-65 0,0 0,0 0,-1 0,1 0,65 0,-65 65,0-65,65 0</inkml:trace>
+  <inkml:trace contextRef="#ctx0" brushRef="#br0" timeOffset="113255.8094">39776 22527,'0'-65,"0"0,-65 65,0 0,0 0,0 0,-65 0,0 0,-1 65,1 0,65-65,0 65,-65 0,65 0,0 0,0-65,65 65,0 1,0-1,65 0,0 65,65-65,-65 65,0-65,65 0,-65 66,66-66,-66-65,0 65,65 0,-65-65,0 65,0-65</inkml:trace>
+</inkml:ink>
 </file>
 
 <file path=ppt/slideLayouts/slideLayout1.xml><?xml version="1.0" encoding="utf-8"?>
@@ -299,7 +341,7 @@
           <a:p>
             <a:fld id="{08D74AC0-95ED-41C1-BA62-2BA5F115270C}" type="datetimeFigureOut">
               <a:rPr lang="es-EC" smtClean="0"/>
-              <a:t>20/8/2020</a:t>
+              <a:t>21/8/2020</a:t>
             </a:fld>
             <a:endParaRPr lang="es-EC" dirty="0"/>
           </a:p>
@@ -574,7 +616,7 @@
           <a:p>
             <a:fld id="{08D74AC0-95ED-41C1-BA62-2BA5F115270C}" type="datetimeFigureOut">
               <a:rPr lang="es-EC" smtClean="0"/>
-              <a:t>20/8/2020</a:t>
+              <a:t>21/8/2020</a:t>
             </a:fld>
             <a:endParaRPr lang="es-EC" dirty="0"/>
           </a:p>
@@ -768,7 +810,7 @@
           <a:p>
             <a:fld id="{08D74AC0-95ED-41C1-BA62-2BA5F115270C}" type="datetimeFigureOut">
               <a:rPr lang="es-EC" smtClean="0"/>
-              <a:t>20/8/2020</a:t>
+              <a:t>21/8/2020</a:t>
             </a:fld>
             <a:endParaRPr lang="es-EC" dirty="0"/>
           </a:p>
@@ -1041,7 +1083,7 @@
           <a:p>
             <a:fld id="{08D74AC0-95ED-41C1-BA62-2BA5F115270C}" type="datetimeFigureOut">
               <a:rPr lang="es-EC" smtClean="0"/>
-              <a:t>20/8/2020</a:t>
+              <a:t>21/8/2020</a:t>
             </a:fld>
             <a:endParaRPr lang="es-EC" dirty="0"/>
           </a:p>
@@ -1382,7 +1424,7 @@
           <a:p>
             <a:fld id="{08D74AC0-95ED-41C1-BA62-2BA5F115270C}" type="datetimeFigureOut">
               <a:rPr lang="es-EC" smtClean="0"/>
-              <a:t>20/8/2020</a:t>
+              <a:t>21/8/2020</a:t>
             </a:fld>
             <a:endParaRPr lang="es-EC" dirty="0"/>
           </a:p>
@@ -2005,7 +2047,7 @@
           <a:p>
             <a:fld id="{08D74AC0-95ED-41C1-BA62-2BA5F115270C}" type="datetimeFigureOut">
               <a:rPr lang="es-EC" smtClean="0"/>
-              <a:t>20/8/2020</a:t>
+              <a:t>21/8/2020</a:t>
             </a:fld>
             <a:endParaRPr lang="es-EC" dirty="0"/>
           </a:p>
@@ -2865,7 +2907,7 @@
           <a:p>
             <a:fld id="{08D74AC0-95ED-41C1-BA62-2BA5F115270C}" type="datetimeFigureOut">
               <a:rPr lang="es-EC" smtClean="0"/>
-              <a:t>20/8/2020</a:t>
+              <a:t>21/8/2020</a:t>
             </a:fld>
             <a:endParaRPr lang="es-EC" dirty="0"/>
           </a:p>
@@ -3035,7 +3077,7 @@
           <a:p>
             <a:fld id="{08D74AC0-95ED-41C1-BA62-2BA5F115270C}" type="datetimeFigureOut">
               <a:rPr lang="es-EC" smtClean="0"/>
-              <a:t>20/8/2020</a:t>
+              <a:t>21/8/2020</a:t>
             </a:fld>
             <a:endParaRPr lang="es-EC" dirty="0"/>
           </a:p>
@@ -3215,7 +3257,7 @@
           <a:p>
             <a:fld id="{08D74AC0-95ED-41C1-BA62-2BA5F115270C}" type="datetimeFigureOut">
               <a:rPr lang="es-EC" smtClean="0"/>
-              <a:t>20/8/2020</a:t>
+              <a:t>21/8/2020</a:t>
             </a:fld>
             <a:endParaRPr lang="es-EC" dirty="0"/>
           </a:p>
@@ -3385,7 +3427,7 @@
           <a:p>
             <a:fld id="{08D74AC0-95ED-41C1-BA62-2BA5F115270C}" type="datetimeFigureOut">
               <a:rPr lang="es-EC" smtClean="0"/>
-              <a:t>20/8/2020</a:t>
+              <a:t>21/8/2020</a:t>
             </a:fld>
             <a:endParaRPr lang="es-EC" dirty="0"/>
           </a:p>
@@ -3632,7 +3674,7 @@
           <a:p>
             <a:fld id="{08D74AC0-95ED-41C1-BA62-2BA5F115270C}" type="datetimeFigureOut">
               <a:rPr lang="es-EC" smtClean="0"/>
-              <a:t>20/8/2020</a:t>
+              <a:t>21/8/2020</a:t>
             </a:fld>
             <a:endParaRPr lang="es-EC" dirty="0"/>
           </a:p>
@@ -3924,7 +3966,7 @@
           <a:p>
             <a:fld id="{08D74AC0-95ED-41C1-BA62-2BA5F115270C}" type="datetimeFigureOut">
               <a:rPr lang="es-EC" smtClean="0"/>
-              <a:t>20/8/2020</a:t>
+              <a:t>21/8/2020</a:t>
             </a:fld>
             <a:endParaRPr lang="es-EC" dirty="0"/>
           </a:p>
@@ -4368,7 +4410,7 @@
           <a:p>
             <a:fld id="{08D74AC0-95ED-41C1-BA62-2BA5F115270C}" type="datetimeFigureOut">
               <a:rPr lang="es-EC" smtClean="0"/>
-              <a:t>20/8/2020</a:t>
+              <a:t>21/8/2020</a:t>
             </a:fld>
             <a:endParaRPr lang="es-EC" dirty="0"/>
           </a:p>
@@ -4486,7 +4528,7 @@
           <a:p>
             <a:fld id="{08D74AC0-95ED-41C1-BA62-2BA5F115270C}" type="datetimeFigureOut">
               <a:rPr lang="es-EC" smtClean="0"/>
-              <a:t>20/8/2020</a:t>
+              <a:t>21/8/2020</a:t>
             </a:fld>
             <a:endParaRPr lang="es-EC" dirty="0"/>
           </a:p>
@@ -4581,7 +4623,7 @@
           <a:p>
             <a:fld id="{08D74AC0-95ED-41C1-BA62-2BA5F115270C}" type="datetimeFigureOut">
               <a:rPr lang="es-EC" smtClean="0"/>
-              <a:t>20/8/2020</a:t>
+              <a:t>21/8/2020</a:t>
             </a:fld>
             <a:endParaRPr lang="es-EC" dirty="0"/>
           </a:p>
@@ -4860,7 +4902,7 @@
           <a:p>
             <a:fld id="{08D74AC0-95ED-41C1-BA62-2BA5F115270C}" type="datetimeFigureOut">
               <a:rPr lang="es-EC" smtClean="0"/>
-              <a:t>20/8/2020</a:t>
+              <a:t>21/8/2020</a:t>
             </a:fld>
             <a:endParaRPr lang="es-EC" dirty="0"/>
           </a:p>
@@ -5135,7 +5177,7 @@
           <a:p>
             <a:fld id="{08D74AC0-95ED-41C1-BA62-2BA5F115270C}" type="datetimeFigureOut">
               <a:rPr lang="es-EC" smtClean="0"/>
-              <a:t>20/8/2020</a:t>
+              <a:t>21/8/2020</a:t>
             </a:fld>
             <a:endParaRPr lang="es-EC" dirty="0"/>
           </a:p>
@@ -5700,7 +5742,7 @@
           <a:p>
             <a:fld id="{08D74AC0-95ED-41C1-BA62-2BA5F115270C}" type="datetimeFigureOut">
               <a:rPr lang="es-EC" smtClean="0"/>
-              <a:t>20/8/2020</a:t>
+              <a:t>21/8/2020</a:t>
             </a:fld>
             <a:endParaRPr lang="es-EC" dirty="0"/>
           </a:p>
@@ -6404,6 +6446,13 @@
   <p:clrMapOvr>
     <a:masterClrMapping/>
   </p:clrMapOvr>
+  <p:timing>
+    <p:tnLst>
+      <p:par>
+        <p:cTn id="1" dur="indefinite" restart="never" nodeType="tmRoot"/>
+      </p:par>
+    </p:tnLst>
+  </p:timing>
 </p:sld>
 </file>
 
@@ -6481,6 +6530,13 @@
   <p:clrMapOvr>
     <a:masterClrMapping/>
   </p:clrMapOvr>
+  <p:timing>
+    <p:tnLst>
+      <p:par>
+        <p:cTn id="1" dur="indefinite" restart="never" nodeType="tmRoot"/>
+      </p:par>
+    </p:tnLst>
+  </p:timing>
 </p:sld>
 </file>
 
@@ -6942,6 +6998,13 @@
   <p:clrMapOvr>
     <a:masterClrMapping/>
   </p:clrMapOvr>
+  <p:timing>
+    <p:tnLst>
+      <p:par>
+        <p:cTn id="1" dur="indefinite" restart="never" nodeType="tmRoot"/>
+      </p:par>
+    </p:tnLst>
+  </p:timing>
 </p:sld>
 </file>
 
@@ -8338,6 +8401,45 @@
           </a:fontRef>
         </p:style>
       </p:cxnSp>
+      <mc:AlternateContent xmlns:mc="http://schemas.openxmlformats.org/markup-compatibility/2006">
+        <mc:Choice xmlns:p14="http://schemas.microsoft.com/office/powerpoint/2010/main" Requires="p14">
+          <p:contentPart p14:bwMode="auto" r:id="rId2">
+            <p14:nvContentPartPr>
+              <p14:cNvPr id="3" name="Entrada de lápiz 2"/>
+              <p14:cNvContentPartPr/>
+              <p14:nvPr/>
+            </p14:nvContentPartPr>
+            <p14:xfrm>
+              <a:off x="1523520" y="5343840"/>
+              <a:ext cx="13124520" cy="3633480"/>
+            </p14:xfrm>
+          </p:contentPart>
+        </mc:Choice>
+        <mc:Fallback>
+          <p:pic>
+            <p:nvPicPr>
+              <p:cNvPr id="3" name="Entrada de lápiz 2"/>
+              <p:cNvPicPr/>
+              <p:nvPr/>
+            </p:nvPicPr>
+            <p:blipFill>
+              <a:blip r:embed="rId3"/>
+              <a:stretch>
+                <a:fillRect/>
+              </a:stretch>
+            </p:blipFill>
+            <p:spPr>
+              <a:xfrm>
+                <a:off x="1514160" y="5334480"/>
+                <a:ext cx="13143240" cy="3652200"/>
+              </a:xfrm>
+              <a:prstGeom prst="rect">
+                <a:avLst/>
+              </a:prstGeom>
+            </p:spPr>
+          </p:pic>
+        </mc:Fallback>
+      </mc:AlternateContent>
     </p:spTree>
     <p:extLst>
       <p:ext uri="{BB962C8B-B14F-4D97-AF65-F5344CB8AC3E}">

</xml_diff>

<commit_message>
trabajando de forma matricial  usando mascaras en EMF
</commit_message>
<xml_diff>
--- a/Flujograma.pptx
+++ b/Flujograma.pptx
@@ -12,6 +12,7 @@
     <p:sldId id="260" r:id="rId6"/>
     <p:sldId id="261" r:id="rId7"/>
     <p:sldId id="262" r:id="rId8"/>
+    <p:sldId id="263" r:id="rId9"/>
   </p:sldIdLst>
   <p:sldSz cx="15998825" cy="18000663"/>
   <p:notesSz cx="6858000" cy="9144000"/>
@@ -118,43 +119,6 @@
 </p:presentation>
 </file>
 
-<file path=ppt/ink/ink1.xml><?xml version="1.0" encoding="utf-8"?>
-<inkml:ink xmlns:inkml="http://www.w3.org/2003/InkML">
-  <inkml:definitions>
-    <inkml:context xml:id="ctx0">
-      <inkml:inkSource xml:id="inkSrc0">
-        <inkml:traceFormat>
-          <inkml:channel name="X" type="integer" max="1366" units="cm"/>
-          <inkml:channel name="Y" type="integer" max="768" units="cm"/>
-        </inkml:traceFormat>
-        <inkml:channelProperties>
-          <inkml:channelProperty channel="X" name="resolution" value="39.7093" units="1/cm"/>
-          <inkml:channelProperty channel="Y" name="resolution" value="39.79275" units="1/cm"/>
-        </inkml:channelProperties>
-      </inkml:inkSource>
-      <inkml:timestamp xml:id="ts0" timeString="2020-08-21T21:39:31.739"/>
-    </inkml:context>
-    <inkml:brush xml:id="br0">
-      <inkml:brushProperty name="width" value="0.05292" units="cm"/>
-      <inkml:brushProperty name="height" value="0.05292" units="cm"/>
-      <inkml:brushProperty name="color" value="#FF0000"/>
-    </inkml:brush>
-  </inkml:definitions>
-  <inkml:trace contextRef="#ctx0" brushRef="#br0">6576 16993,'0'0,"-65"0,-66 0,66 0,-390 0,324 0,66 0,0 65,0-65,0 65,0-65,0 0,0 65,0-65,0 65,-1-65,66 65,-65 0,-65 1,130 64,-65-65,0 65,0 0,0-65,65 66,-65-66,0 130,-1-130,66 65,-65 1,65-1,0 0,-65 0,65-65,0 66,-65-1,65 0,0-65,0 65,0 1,0-1,0 0,0 0,0-65,0 65,0 1,0-66,0 65,0 0,0 0,65-64,-65-1,0 65,65-65,-65 0,0 65,0-65,65 0,1 66,-66-66,0 0,0 65,65-65,0 0,-65 66,0-1,65 0,0-65,-65 65,65 1,0-66,0 65,-65-65,65 0,0-65,-65 65,66 0,-1-65,-65 65,65-65,65 65,-130 1,130-66,-130 130,130-130,-65 130,1-130,-1 130,0-130,0 65,0 0,0-65,-65 66,65-66,0 0,0 0,-65 65,65-65,1 0,-1 65,0-65,-65 65,65-65,0 0,0 0,0 0,-65 65,65-65,0 0,0 0,1 0,64 0,-65 65,65-65,-65 65,0-65,65 0,-64 65,-1 0,65-65,-65 65,65-65,-65 66,0-66,0 0,1 0,-1 0,0 0,0 0,0 0,65 0,-65 0,0 0,0 0,66 0,-66 0,0 0,0 0,0 0,0 0,65 0,-65 0,66 0,-66 0,0 0,65 0,-65 65,0-65,0 0,66 65,-66-65,0 0,65 0,-65 0,0 0,0 0,0 0,66 0,-66 0,0 0,0 0,0 0,0 0,0 0,0 0,0 0,0-65,1 0,-1 65,65-66,-65 1,0 65,65-65,-65 0,0 65,-65-65,65 65,-65-65,66 0,-1 0,0 65,-65-65,65 0,0-66,65 66,-130 0,130-65,-130 65,131-65,-131 64,130-64,-65 0,65-65,-65 65,0-1,65-64,-64 65,64-66,-130 66,130 65,-65-130,0 130,0 0,-65-66,65 66,0 0,-65-65,66 65,-1-65,-65 65,65-1,-65-64,65 0,-65 65,65-65,-65-1,0 1,65 65,-65-65,0 0,0 0,0-1,0 66,0-65,0 65,65-65,-65 65,0-1,0 1,0 0,0 0,0 0,-65 65,65-65,-65 65,65-65,-65 65,65-65,-65 0,0 65,65-66,-65 66,65-65,-66 65,1-65,0 0,-65 65,65-65,-65-65,0 130,-66-130,66 65,-65-1,65-64,-1 130,-64-65,130 0,0 65,0-65,-65 65,64-65,-64 65,0 0,-65 0,65 0,-1 0,1-65,0 0,65 65,-65 0,65-66,0 66,-1 0,1-65,0 65,0 0,0 0,0-65,0 65,0 0,-131-65,66 65,0 0,-65-65,65 65,-66 0,66 0,0 0,0 0,65 0,-1 0,66-65,-65 65,-65 0,65 0,-65 0,0 0,-1 0,1 0,0 0,0 0,65 0,0 0,0 0,-66-65,66 65,-130-65,130 65,0 0,-65 0,64 0,1 0,0 0,0 0,0 0,0 0,0 0,0 0,0 0,0 0,-1 0,66-65,-65 65,0 0</inkml:trace>
-  <inkml:trace contextRef="#ctx0" brushRef="#br0" timeOffset="98783.3659">29881 15040,'65'0,"1"0,-1 0,0 0,-65-65,65 65,0 0,0 0,-65-66,65 66,0 0,0 0,0 0,-65-65,66 65,-1 0,0 0,0 0,0 0,0 0,0 0,0 0,0 0,0 65,1-65,-1 66,0-66,-65 65,65-65</inkml:trace>
-  <inkml:trace contextRef="#ctx0" brushRef="#br0" timeOffset="100199.9746">29621 16016,'65'0,"-65"-65,130 65,-65 0,-65-65,65 65</inkml:trace>
-  <inkml:trace contextRef="#ctx0" brushRef="#br0" timeOffset="100817.4372">29881 15886,'0'65,"0"65,0-65,0 1,0-1,0 0,0 0,0 0,0 0</inkml:trace>
-  <inkml:trace contextRef="#ctx0" brushRef="#br0" timeOffset="101471.9248">29686 16667,'65'0,"0"0,0 0,0 0,1 0,-1 0,0 0,0 0,0 0,0 0,-65-65</inkml:trace>
-  <inkml:trace contextRef="#ctx0" brushRef="#br0" timeOffset="103128.4096">30337 16602,'0'-65,"0"0,0 0,65 0,-65 0,0 0,65 65,-65-66,65 66,-65-65,65 65,1 0,-66 65,0 1,0-1,0 0,0 0,0 0,65-65,0 0,-65-65,65 0,0 0,0 65,-65 65,65 0,-65 0,0 0,65-65,-65 65,0 0,0 0</inkml:trace>
-  <inkml:trace contextRef="#ctx0" brushRef="#br0" timeOffset="104279.9133">31704 16472,'-65'-65,"0"65,0 0,0 0,0 0,0 0,-1 0,66 65,-65-65,65 65,0 0,0 0,0 0,65 0,1-65,-1 66,0-66,0 0,0 0,0 0,0 0,-65-66,65 66,0 0,-65-65,0 0,0 0,65 65,-65 65,0 0,0 0,0 1,0-1,66 0,-1-65,0 0</inkml:trace>
-  <inkml:trace contextRef="#ctx0" brushRef="#br0" timeOffset="105408.5284">32616 16537,'-66'0,"1"0,0 0,0 0,0 65,65 0,0 0,0 0,0 1,65-66,0 0,0 0,0 0,1-66,-66 1,65 65,-65 65,-65 66,65-66,-66 0,66 0,-65 0,0 0,0 0,-65 0,130 1,-65-66,0 0,0 0,0 0,-1 0,1 0</inkml:trace>
-  <inkml:trace contextRef="#ctx0" brushRef="#br0" timeOffset="106551.7779">33071 16993,'65'0,"-65"-65,65 0,-65-1,66 66,-66-65,65 65,-65-65,0 0,0 0,-65 65,65-65,-66 65,1 0,-65 0,65 0,65 65,-65-65,65 65,-65-65,65 65,0 0,0 0,0 1,0-1,0 65,0-65,65-65,-65 65,65 0,-65 0,65-65,-65 65,65-65,0 0,0 0,1 0,-1 0,-65-65,65 65,-65-65</inkml:trace>
-  <inkml:trace contextRef="#ctx0" brushRef="#br0" timeOffset="107663.6867">33397 16602,'0'65,"0"0,0 0,0 1,0-1,0 0,0 0,0 0,0 0,65-65,-65-65,65 0,-65-65,65-66,0 131,-65-65,0 0,65 0,0 65,-65 130,0 0,0 0,0 65,0-65,0 0,0 0,0 0,0 1,0-1,0 0,0 0</inkml:trace>
-  <inkml:trace contextRef="#ctx0" brushRef="#br0" timeOffset="111153.6421">38800 17383,'65'0,"0"66,0 64,0-65,66 65,-66 65,65 1,65-1,-65 65,1 1,-1 64,0-129,-65 129,65-64,-65-1,66 66,-66-66,0 66,-65-66,0 0,65-64,-65-66,0 0,0 0,0-64,0-1,0 0,0 0,0 0,0 0,-65 0,65 0,0 0,-65 1,0-66,65-66,-66 66,66-65,-65 65,0 0,-65 0,0 0,0 0,-1 0,1 0,65 0,-65 65,0-65,65 0</inkml:trace>
-  <inkml:trace contextRef="#ctx0" brushRef="#br0" timeOffset="113255.8094">39776 22527,'0'-65,"0"0,-65 65,0 0,0 0,0 0,-65 0,0 0,-1 65,1 0,65-65,0 65,-65 0,65 0,0 0,0-65,65 65,0 1,0-1,65 0,0 65,65-65,-65 65,0-65,65 0,-65 66,66-66,-66-65,0 65,65 0,-65-65,0 65,0-65</inkml:trace>
-</inkml:ink>
-</file>
-
 <file path=ppt/slideLayouts/slideLayout1.xml><?xml version="1.0" encoding="utf-8"?>
 <p:sldLayout xmlns:a="http://schemas.openxmlformats.org/drawingml/2006/main" xmlns:r="http://schemas.openxmlformats.org/officeDocument/2006/relationships" xmlns:p="http://schemas.openxmlformats.org/presentationml/2006/main" type="title" preserve="1">
   <p:cSld name="Diapositiva de título">
@@ -341,7 +305,7 @@
           <a:p>
             <a:fld id="{08D74AC0-95ED-41C1-BA62-2BA5F115270C}" type="datetimeFigureOut">
               <a:rPr lang="es-EC" smtClean="0"/>
-              <a:t>21/8/2020</a:t>
+              <a:t>26/8/2020</a:t>
             </a:fld>
             <a:endParaRPr lang="es-EC" dirty="0"/>
           </a:p>
@@ -616,7 +580,7 @@
           <a:p>
             <a:fld id="{08D74AC0-95ED-41C1-BA62-2BA5F115270C}" type="datetimeFigureOut">
               <a:rPr lang="es-EC" smtClean="0"/>
-              <a:t>21/8/2020</a:t>
+              <a:t>26/8/2020</a:t>
             </a:fld>
             <a:endParaRPr lang="es-EC" dirty="0"/>
           </a:p>
@@ -810,7 +774,7 @@
           <a:p>
             <a:fld id="{08D74AC0-95ED-41C1-BA62-2BA5F115270C}" type="datetimeFigureOut">
               <a:rPr lang="es-EC" smtClean="0"/>
-              <a:t>21/8/2020</a:t>
+              <a:t>26/8/2020</a:t>
             </a:fld>
             <a:endParaRPr lang="es-EC" dirty="0"/>
           </a:p>
@@ -1083,7 +1047,7 @@
           <a:p>
             <a:fld id="{08D74AC0-95ED-41C1-BA62-2BA5F115270C}" type="datetimeFigureOut">
               <a:rPr lang="es-EC" smtClean="0"/>
-              <a:t>21/8/2020</a:t>
+              <a:t>26/8/2020</a:t>
             </a:fld>
             <a:endParaRPr lang="es-EC" dirty="0"/>
           </a:p>
@@ -1424,7 +1388,7 @@
           <a:p>
             <a:fld id="{08D74AC0-95ED-41C1-BA62-2BA5F115270C}" type="datetimeFigureOut">
               <a:rPr lang="es-EC" smtClean="0"/>
-              <a:t>21/8/2020</a:t>
+              <a:t>26/8/2020</a:t>
             </a:fld>
             <a:endParaRPr lang="es-EC" dirty="0"/>
           </a:p>
@@ -2047,7 +2011,7 @@
           <a:p>
             <a:fld id="{08D74AC0-95ED-41C1-BA62-2BA5F115270C}" type="datetimeFigureOut">
               <a:rPr lang="es-EC" smtClean="0"/>
-              <a:t>21/8/2020</a:t>
+              <a:t>26/8/2020</a:t>
             </a:fld>
             <a:endParaRPr lang="es-EC" dirty="0"/>
           </a:p>
@@ -2907,7 +2871,7 @@
           <a:p>
             <a:fld id="{08D74AC0-95ED-41C1-BA62-2BA5F115270C}" type="datetimeFigureOut">
               <a:rPr lang="es-EC" smtClean="0"/>
-              <a:t>21/8/2020</a:t>
+              <a:t>26/8/2020</a:t>
             </a:fld>
             <a:endParaRPr lang="es-EC" dirty="0"/>
           </a:p>
@@ -3077,7 +3041,7 @@
           <a:p>
             <a:fld id="{08D74AC0-95ED-41C1-BA62-2BA5F115270C}" type="datetimeFigureOut">
               <a:rPr lang="es-EC" smtClean="0"/>
-              <a:t>21/8/2020</a:t>
+              <a:t>26/8/2020</a:t>
             </a:fld>
             <a:endParaRPr lang="es-EC" dirty="0"/>
           </a:p>
@@ -3257,7 +3221,7 @@
           <a:p>
             <a:fld id="{08D74AC0-95ED-41C1-BA62-2BA5F115270C}" type="datetimeFigureOut">
               <a:rPr lang="es-EC" smtClean="0"/>
-              <a:t>21/8/2020</a:t>
+              <a:t>26/8/2020</a:t>
             </a:fld>
             <a:endParaRPr lang="es-EC" dirty="0"/>
           </a:p>
@@ -3427,7 +3391,7 @@
           <a:p>
             <a:fld id="{08D74AC0-95ED-41C1-BA62-2BA5F115270C}" type="datetimeFigureOut">
               <a:rPr lang="es-EC" smtClean="0"/>
-              <a:t>21/8/2020</a:t>
+              <a:t>26/8/2020</a:t>
             </a:fld>
             <a:endParaRPr lang="es-EC" dirty="0"/>
           </a:p>
@@ -3674,7 +3638,7 @@
           <a:p>
             <a:fld id="{08D74AC0-95ED-41C1-BA62-2BA5F115270C}" type="datetimeFigureOut">
               <a:rPr lang="es-EC" smtClean="0"/>
-              <a:t>21/8/2020</a:t>
+              <a:t>26/8/2020</a:t>
             </a:fld>
             <a:endParaRPr lang="es-EC" dirty="0"/>
           </a:p>
@@ -3966,7 +3930,7 @@
           <a:p>
             <a:fld id="{08D74AC0-95ED-41C1-BA62-2BA5F115270C}" type="datetimeFigureOut">
               <a:rPr lang="es-EC" smtClean="0"/>
-              <a:t>21/8/2020</a:t>
+              <a:t>26/8/2020</a:t>
             </a:fld>
             <a:endParaRPr lang="es-EC" dirty="0"/>
           </a:p>
@@ -4410,7 +4374,7 @@
           <a:p>
             <a:fld id="{08D74AC0-95ED-41C1-BA62-2BA5F115270C}" type="datetimeFigureOut">
               <a:rPr lang="es-EC" smtClean="0"/>
-              <a:t>21/8/2020</a:t>
+              <a:t>26/8/2020</a:t>
             </a:fld>
             <a:endParaRPr lang="es-EC" dirty="0"/>
           </a:p>
@@ -4528,7 +4492,7 @@
           <a:p>
             <a:fld id="{08D74AC0-95ED-41C1-BA62-2BA5F115270C}" type="datetimeFigureOut">
               <a:rPr lang="es-EC" smtClean="0"/>
-              <a:t>21/8/2020</a:t>
+              <a:t>26/8/2020</a:t>
             </a:fld>
             <a:endParaRPr lang="es-EC" dirty="0"/>
           </a:p>
@@ -4623,7 +4587,7 @@
           <a:p>
             <a:fld id="{08D74AC0-95ED-41C1-BA62-2BA5F115270C}" type="datetimeFigureOut">
               <a:rPr lang="es-EC" smtClean="0"/>
-              <a:t>21/8/2020</a:t>
+              <a:t>26/8/2020</a:t>
             </a:fld>
             <a:endParaRPr lang="es-EC" dirty="0"/>
           </a:p>
@@ -4902,7 +4866,7 @@
           <a:p>
             <a:fld id="{08D74AC0-95ED-41C1-BA62-2BA5F115270C}" type="datetimeFigureOut">
               <a:rPr lang="es-EC" smtClean="0"/>
-              <a:t>21/8/2020</a:t>
+              <a:t>26/8/2020</a:t>
             </a:fld>
             <a:endParaRPr lang="es-EC" dirty="0"/>
           </a:p>
@@ -5177,7 +5141,7 @@
           <a:p>
             <a:fld id="{08D74AC0-95ED-41C1-BA62-2BA5F115270C}" type="datetimeFigureOut">
               <a:rPr lang="es-EC" smtClean="0"/>
-              <a:t>21/8/2020</a:t>
+              <a:t>26/8/2020</a:t>
             </a:fld>
             <a:endParaRPr lang="es-EC" dirty="0"/>
           </a:p>
@@ -5742,7 +5706,7 @@
           <a:p>
             <a:fld id="{08D74AC0-95ED-41C1-BA62-2BA5F115270C}" type="datetimeFigureOut">
               <a:rPr lang="es-EC" smtClean="0"/>
-              <a:t>21/8/2020</a:t>
+              <a:t>26/8/2020</a:t>
             </a:fld>
             <a:endParaRPr lang="es-EC" dirty="0"/>
           </a:p>
@@ -7502,16 +7466,17 @@
             <a:pPr algn="ctr"/>
             <a:r>
               <a:rPr lang="es-MX" dirty="0"/>
-              <a:t>Definición de parámetro</a:t>
-            </a:r>
-          </a:p>
-          <a:p>
-            <a:pPr algn="ctr"/>
-            <a:r>
-              <a:rPr lang="es-MX" dirty="0"/>
-              <a:t>(tamaño de la imagen de prueba y logo. Matrices vacías) </a:t>
-            </a:r>
-            <a:endParaRPr lang="es-EC" dirty="0"/>
+              <a:t>Definición de </a:t>
+            </a:r>
+            <a:r>
+              <a:rPr lang="es-MX" dirty="0" smtClean="0"/>
+              <a:t>parámetro</a:t>
+            </a:r>
+            <a:r>
+              <a:rPr lang="es-EC" dirty="0"/>
+              <a:t>s</a:t>
+            </a:r>
+            <a:endParaRPr lang="es-MX" dirty="0"/>
           </a:p>
         </p:txBody>
       </p:sp>
@@ -7558,7 +7523,7 @@
         </p:nvSpPr>
         <p:spPr>
           <a:xfrm>
-            <a:off x="1933937" y="6471831"/>
+            <a:off x="1904798" y="6561040"/>
             <a:ext cx="2943923" cy="2230244"/>
           </a:xfrm>
           <a:prstGeom prst="rect">
@@ -7590,24 +7555,16 @@
           <a:p>
             <a:pPr algn="ctr"/>
             <a:r>
-              <a:rPr lang="es-MX" dirty="0"/>
-              <a:t>Barrido del logo usando bordes, por cada </a:t>
-            </a:r>
-            <a:r>
-              <a:rPr lang="es-MX" dirty="0" err="1"/>
-              <a:t>pixcel</a:t>
-            </a:r>
-            <a:r>
-              <a:rPr lang="es-MX" dirty="0"/>
-              <a:t> se crea un vecindario, a cada vecindario se le obtiene los momentos de HU usando </a:t>
-            </a:r>
-            <a:r>
-              <a:rPr lang="es-MX" dirty="0" err="1"/>
-              <a:t>hu_moment_fast</a:t>
-            </a:r>
-            <a:r>
-              <a:rPr lang="es-MX" dirty="0"/>
-              <a:t> </a:t>
+              <a:rPr lang="es-MX" dirty="0" smtClean="0"/>
+              <a:t>Momentos de </a:t>
+            </a:r>
+            <a:r>
+              <a:rPr lang="es-MX" dirty="0" err="1" smtClean="0"/>
+              <a:t>Hu</a:t>
+            </a:r>
+            <a:r>
+              <a:rPr lang="es-MX" dirty="0" smtClean="0"/>
+              <a:t> de cada vecindario de cada pixel en el logo</a:t>
             </a:r>
             <a:endParaRPr lang="es-EC" dirty="0"/>
           </a:p>
@@ -7623,7 +7580,7 @@
         </p:nvCxnSpPr>
         <p:spPr>
           <a:xfrm flipH="1">
-            <a:off x="3405898" y="8702076"/>
+            <a:off x="3376759" y="8791285"/>
             <a:ext cx="1" cy="669073"/>
           </a:xfrm>
           <a:prstGeom prst="straightConnector1">
@@ -7688,19 +7645,27 @@
           <a:p>
             <a:pPr algn="ctr"/>
             <a:r>
+              <a:rPr lang="es-MX" dirty="0" smtClean="0"/>
+              <a:t>Factor </a:t>
+            </a:r>
+            <a:r>
               <a:rPr lang="es-MX" dirty="0"/>
-              <a:t>Se calcula un factor de normalización</a:t>
+              <a:t>de normalización</a:t>
             </a:r>
           </a:p>
           <a:p>
             <a:pPr algn="ctr"/>
             <a:r>
-              <a:rPr lang="es-MX" dirty="0" err="1"/>
+              <a:rPr lang="es-MX" dirty="0" smtClean="0"/>
+              <a:t>(</a:t>
+            </a:r>
+            <a:r>
+              <a:rPr lang="es-MX" dirty="0" err="1" smtClean="0"/>
               <a:t>Weight</a:t>
             </a:r>
             <a:r>
-              <a:rPr lang="es-MX" dirty="0"/>
-              <a:t>=1/varianza</a:t>
+              <a:rPr lang="es-MX" dirty="0" smtClean="0"/>
+              <a:t>=1/varianza)</a:t>
             </a:r>
             <a:endParaRPr lang="es-EC" dirty="0"/>
           </a:p>
@@ -7844,23 +7809,19 @@
             <a:pPr algn="ctr"/>
             <a:r>
               <a:rPr lang="es-MX" dirty="0"/>
-              <a:t>Barrido de la imagen de prueba usando bordes, por cada </a:t>
+              <a:t>Momentos de </a:t>
             </a:r>
             <a:r>
               <a:rPr lang="es-MX" dirty="0" err="1"/>
-              <a:t>pixcel</a:t>
+              <a:t>Hu</a:t>
             </a:r>
             <a:r>
               <a:rPr lang="es-MX" dirty="0"/>
-              <a:t> se crea un vecindario, a cada vecindario se le obtiene los momentos de HU usando </a:t>
-            </a:r>
-            <a:r>
-              <a:rPr lang="es-MX" dirty="0" err="1"/>
-              <a:t>hu_moment_fast</a:t>
-            </a:r>
-            <a:r>
-              <a:rPr lang="es-MX" dirty="0"/>
-              <a:t> </a:t>
+              <a:t> de cada vecindario de cada pixel en </a:t>
+            </a:r>
+            <a:r>
+              <a:rPr lang="es-MX" dirty="0" smtClean="0"/>
+              <a:t>la imagen</a:t>
             </a:r>
             <a:endParaRPr lang="es-EC" dirty="0"/>
           </a:p>
@@ -7906,8 +7867,12 @@
           <a:p>
             <a:pPr algn="ctr"/>
             <a:r>
+              <a:rPr lang="es-MX" dirty="0" smtClean="0"/>
+              <a:t>Se realiza un barrido en la imagen </a:t>
+            </a:r>
+            <a:r>
               <a:rPr lang="es-MX" dirty="0"/>
-              <a:t>Por cada pixel de la imagen de prueba se realiza un barrido en la matriz de momentos de HU del logo.</a:t>
+              <a:t>de momentos de HU del logo.</a:t>
             </a:r>
             <a:endParaRPr lang="es-EC" dirty="0"/>
           </a:p>
@@ -7988,8 +7953,12 @@
           <a:p>
             <a:pPr algn="ctr"/>
             <a:r>
+              <a:rPr lang="es-MX" dirty="0" smtClean="0"/>
+              <a:t>Distancia </a:t>
+            </a:r>
+            <a:r>
               <a:rPr lang="es-MX" dirty="0"/>
-              <a:t>Se calcula la distancia geométrica entre la cada punto de la matriz de </a:t>
+              <a:t>geométrica entre la cada punto de la matriz de </a:t>
             </a:r>
             <a:r>
               <a:rPr lang="es-MX" dirty="0" err="1"/>
@@ -8083,11 +8052,7 @@
             <a:pPr algn="ctr"/>
             <a:r>
               <a:rPr lang="es-MX" dirty="0" smtClean="0"/>
-              <a:t>Se normaliza la distancia con el factor </a:t>
-            </a:r>
-            <a:r>
-              <a:rPr lang="es-MX" dirty="0" err="1" smtClean="0"/>
-              <a:t>weight</a:t>
+              <a:t>Se normaliza la distancia con el factor weight</a:t>
             </a:r>
             <a:endParaRPr lang="es-EC" dirty="0"/>
           </a:p>
@@ -8401,49 +8366,969 @@
           </a:fontRef>
         </p:style>
       </p:cxnSp>
-      <mc:AlternateContent xmlns:mc="http://schemas.openxmlformats.org/markup-compatibility/2006">
-        <mc:Choice xmlns:p14="http://schemas.microsoft.com/office/powerpoint/2010/main" Requires="p14">
-          <p:contentPart p14:bwMode="auto" r:id="rId2">
-            <p14:nvContentPartPr>
-              <p14:cNvPr id="3" name="Entrada de lápiz 2"/>
-              <p14:cNvContentPartPr/>
-              <p14:nvPr/>
-            </p14:nvContentPartPr>
-            <p14:xfrm>
-              <a:off x="1523520" y="5343840"/>
-              <a:ext cx="13124520" cy="3633480"/>
-            </p14:xfrm>
-          </p:contentPart>
-        </mc:Choice>
-        <mc:Fallback>
-          <p:pic>
-            <p:nvPicPr>
-              <p:cNvPr id="3" name="Entrada de lápiz 2"/>
-              <p:cNvPicPr/>
-              <p:nvPr/>
-            </p:nvPicPr>
-            <p:blipFill>
-              <a:blip r:embed="rId3"/>
-              <a:stretch>
-                <a:fillRect/>
-              </a:stretch>
-            </p:blipFill>
-            <p:spPr>
-              <a:xfrm>
-                <a:off x="1514160" y="5334480"/>
-                <a:ext cx="13143240" cy="3652200"/>
-              </a:xfrm>
-              <a:prstGeom prst="rect">
-                <a:avLst/>
-              </a:prstGeom>
-            </p:spPr>
-          </p:pic>
-        </mc:Fallback>
-      </mc:AlternateContent>
     </p:spTree>
     <p:extLst>
       <p:ext uri="{BB962C8B-B14F-4D97-AF65-F5344CB8AC3E}">
         <p14:creationId xmlns:p14="http://schemas.microsoft.com/office/powerpoint/2010/main" val="922544583"/>
+      </p:ext>
+    </p:extLst>
+  </p:cSld>
+  <p:clrMapOvr>
+    <a:masterClrMapping/>
+  </p:clrMapOvr>
+  <p:timing>
+    <p:tnLst>
+      <p:par>
+        <p:cTn id="1" dur="indefinite" restart="never" nodeType="tmRoot"/>
+      </p:par>
+    </p:tnLst>
+  </p:timing>
+</p:sld>
+</file>
+
+<file path=ppt/slides/slide8.xml><?xml version="1.0" encoding="utf-8"?>
+<p:sld xmlns:a="http://schemas.openxmlformats.org/drawingml/2006/main" xmlns:r="http://schemas.openxmlformats.org/officeDocument/2006/relationships" xmlns:p="http://schemas.openxmlformats.org/presentationml/2006/main">
+  <p:cSld>
+    <p:spTree>
+      <p:nvGrpSpPr>
+        <p:cNvPr id="1" name=""/>
+        <p:cNvGrpSpPr/>
+        <p:nvPr/>
+      </p:nvGrpSpPr>
+      <p:grpSpPr>
+        <a:xfrm>
+          <a:off x="0" y="0"/>
+          <a:ext cx="0" cy="0"/>
+          <a:chOff x="0" y="0"/>
+          <a:chExt cx="0" cy="0"/>
+        </a:xfrm>
+      </p:grpSpPr>
+      <p:sp>
+        <p:nvSpPr>
+          <p:cNvPr id="2" name="Título 1"/>
+          <p:cNvSpPr>
+            <a:spLocks noGrp="1"/>
+          </p:cNvSpPr>
+          <p:nvPr>
+            <p:ph type="title"/>
+          </p:nvPr>
+        </p:nvSpPr>
+        <p:spPr>
+          <a:xfrm>
+            <a:off x="848075" y="364799"/>
+            <a:ext cx="12344465" cy="3676067"/>
+          </a:xfrm>
+        </p:spPr>
+        <p:txBody>
+          <a:bodyPr/>
+          <a:lstStyle/>
+          <a:p>
+            <a:r>
+              <a:rPr lang="es-MX" dirty="0" smtClean="0"/>
+              <a:t>Función NLM_HU</a:t>
+            </a:r>
+            <a:br>
+              <a:rPr lang="es-MX" dirty="0" smtClean="0"/>
+            </a:br>
+            <a:r>
+              <a:rPr lang="es-MX" sz="3600" dirty="0"/>
+              <a:t>Recibe:  Imagen de prueba, logo, parámetros </a:t>
+            </a:r>
+            <a:r>
+              <a:rPr lang="es-MX" sz="3600" dirty="0" err="1"/>
+              <a:t>th</a:t>
+            </a:r>
+            <a:r>
+              <a:rPr lang="es-MX" sz="3600" dirty="0"/>
+              <a:t> y </a:t>
+            </a:r>
+            <a:r>
+              <a:rPr lang="es-MX" sz="3600" dirty="0" err="1"/>
+              <a:t>bb</a:t>
+            </a:r>
+            <a:r>
+              <a:rPr lang="es-MX" sz="3600" dirty="0"/>
+              <a:t/>
+            </a:r>
+            <a:br>
+              <a:rPr lang="es-MX" sz="3600" dirty="0"/>
+            </a:br>
+            <a:r>
+              <a:rPr lang="es-MX" sz="3600" dirty="0"/>
+              <a:t>Devuelve: Matrices con las imágenes resultantes</a:t>
+            </a:r>
+            <a:r>
+              <a:rPr lang="es-MX" dirty="0" smtClean="0"/>
+              <a:t> </a:t>
+            </a:r>
+            <a:endParaRPr lang="es-EC" dirty="0"/>
+          </a:p>
+        </p:txBody>
+      </p:sp>
+      <p:sp>
+        <p:nvSpPr>
+          <p:cNvPr id="3" name="Elipse 2"/>
+          <p:cNvSpPr/>
+          <p:nvPr/>
+        </p:nvSpPr>
+        <p:spPr>
+          <a:xfrm>
+            <a:off x="6217807" y="4898570"/>
+            <a:ext cx="2488700" cy="1975196"/>
+          </a:xfrm>
+          <a:prstGeom prst="ellipse">
+            <a:avLst/>
+          </a:prstGeom>
+        </p:spPr>
+        <p:style>
+          <a:lnRef idx="1">
+            <a:schemeClr val="accent4"/>
+          </a:lnRef>
+          <a:fillRef idx="2">
+            <a:schemeClr val="accent4"/>
+          </a:fillRef>
+          <a:effectRef idx="1">
+            <a:schemeClr val="accent4"/>
+          </a:effectRef>
+          <a:fontRef idx="minor">
+            <a:schemeClr val="dk1"/>
+          </a:fontRef>
+        </p:style>
+        <p:txBody>
+          <a:bodyPr rtlCol="0" anchor="ctr"/>
+          <a:lstStyle/>
+          <a:p>
+            <a:pPr algn="ctr"/>
+            <a:r>
+              <a:rPr lang="es-EC" dirty="0" smtClean="0"/>
+              <a:t>Condiciones iniciales</a:t>
+            </a:r>
+            <a:endParaRPr lang="es-EC" dirty="0"/>
+          </a:p>
+        </p:txBody>
+      </p:sp>
+      <p:cxnSp>
+        <p:nvCxnSpPr>
+          <p:cNvPr id="7" name="Conector curvado 6"/>
+          <p:cNvCxnSpPr>
+            <a:stCxn id="2" idx="2"/>
+          </p:cNvCxnSpPr>
+          <p:nvPr/>
+        </p:nvCxnSpPr>
+        <p:spPr>
+          <a:xfrm rot="16200000" flipH="1">
+            <a:off x="6812380" y="4248793"/>
+            <a:ext cx="857705" cy="441849"/>
+          </a:xfrm>
+          <a:prstGeom prst="curvedConnector3">
+            <a:avLst>
+              <a:gd name="adj1" fmla="val 66543"/>
+            </a:avLst>
+          </a:prstGeom>
+          <a:ln>
+            <a:tailEnd type="triangle"/>
+          </a:ln>
+        </p:spPr>
+        <p:style>
+          <a:lnRef idx="3">
+            <a:schemeClr val="accent4"/>
+          </a:lnRef>
+          <a:fillRef idx="0">
+            <a:schemeClr val="accent4"/>
+          </a:fillRef>
+          <a:effectRef idx="2">
+            <a:schemeClr val="accent4"/>
+          </a:effectRef>
+          <a:fontRef idx="minor">
+            <a:schemeClr val="tx1"/>
+          </a:fontRef>
+        </p:style>
+      </p:cxnSp>
+      <p:sp>
+        <p:nvSpPr>
+          <p:cNvPr id="11" name="CuadroTexto 10"/>
+          <p:cNvSpPr txBox="1"/>
+          <p:nvPr/>
+        </p:nvSpPr>
+        <p:spPr>
+          <a:xfrm>
+            <a:off x="7462157" y="4040864"/>
+            <a:ext cx="793807" cy="369332"/>
+          </a:xfrm>
+          <a:prstGeom prst="rect">
+            <a:avLst/>
+          </a:prstGeom>
+          <a:noFill/>
+        </p:spPr>
+        <p:txBody>
+          <a:bodyPr wrap="none" rtlCol="0">
+            <a:spAutoFit/>
+          </a:bodyPr>
+          <a:lstStyle/>
+          <a:p>
+            <a:r>
+              <a:rPr lang="es-EC" dirty="0" smtClean="0"/>
+              <a:t>Reset</a:t>
+            </a:r>
+            <a:endParaRPr lang="es-EC" dirty="0"/>
+          </a:p>
+        </p:txBody>
+      </p:sp>
+      <p:sp>
+        <p:nvSpPr>
+          <p:cNvPr id="42" name="Elipse 41"/>
+          <p:cNvSpPr/>
+          <p:nvPr/>
+        </p:nvSpPr>
+        <p:spPr>
+          <a:xfrm>
+            <a:off x="9295743" y="7358727"/>
+            <a:ext cx="2488700" cy="1975196"/>
+          </a:xfrm>
+          <a:prstGeom prst="ellipse">
+            <a:avLst/>
+          </a:prstGeom>
+        </p:spPr>
+        <p:style>
+          <a:lnRef idx="1">
+            <a:schemeClr val="accent4"/>
+          </a:lnRef>
+          <a:fillRef idx="2">
+            <a:schemeClr val="accent4"/>
+          </a:fillRef>
+          <a:effectRef idx="1">
+            <a:schemeClr val="accent4"/>
+          </a:effectRef>
+          <a:fontRef idx="minor">
+            <a:schemeClr val="dk1"/>
+          </a:fontRef>
+        </p:style>
+        <p:txBody>
+          <a:bodyPr rtlCol="0" anchor="ctr"/>
+          <a:lstStyle/>
+          <a:p>
+            <a:pPr algn="ctr"/>
+            <a:r>
+              <a:rPr lang="es-EC" dirty="0" smtClean="0"/>
+              <a:t>Momentos de HU en el logo</a:t>
+            </a:r>
+            <a:endParaRPr lang="es-EC" dirty="0"/>
+          </a:p>
+        </p:txBody>
+      </p:sp>
+      <p:cxnSp>
+        <p:nvCxnSpPr>
+          <p:cNvPr id="13" name="Conector curvado 12"/>
+          <p:cNvCxnSpPr>
+            <a:stCxn id="3" idx="6"/>
+          </p:cNvCxnSpPr>
+          <p:nvPr/>
+        </p:nvCxnSpPr>
+        <p:spPr>
+          <a:xfrm>
+            <a:off x="8706507" y="5886168"/>
+            <a:ext cx="1178472" cy="1602453"/>
+          </a:xfrm>
+          <a:prstGeom prst="curvedConnector2">
+            <a:avLst/>
+          </a:prstGeom>
+          <a:ln>
+            <a:tailEnd type="triangle"/>
+          </a:ln>
+        </p:spPr>
+        <p:style>
+          <a:lnRef idx="3">
+            <a:schemeClr val="accent4"/>
+          </a:lnRef>
+          <a:fillRef idx="0">
+            <a:schemeClr val="accent4"/>
+          </a:fillRef>
+          <a:effectRef idx="2">
+            <a:schemeClr val="accent4"/>
+          </a:effectRef>
+          <a:fontRef idx="minor">
+            <a:schemeClr val="tx1"/>
+          </a:fontRef>
+        </p:style>
+      </p:cxnSp>
+      <p:sp>
+        <p:nvSpPr>
+          <p:cNvPr id="23" name="Forma libre 22"/>
+          <p:cNvSpPr/>
+          <p:nvPr/>
+        </p:nvSpPr>
+        <p:spPr>
+          <a:xfrm>
+            <a:off x="11101273" y="6902223"/>
+            <a:ext cx="1719014" cy="1453501"/>
+          </a:xfrm>
+          <a:custGeom>
+            <a:avLst/>
+            <a:gdLst>
+              <a:gd name="connsiteX0" fmla="*/ 659803 w 1719014"/>
+              <a:gd name="connsiteY0" fmla="*/ 1453501 h 1453501"/>
+              <a:gd name="connsiteX1" fmla="*/ 1716093 w 1719014"/>
+              <a:gd name="connsiteY1" fmla="*/ 334149 h 1453501"/>
+              <a:gd name="connsiteX2" fmla="*/ 943582 w 1719014"/>
+              <a:gd name="connsiteY2" fmla="*/ 3074 h 1453501"/>
+              <a:gd name="connsiteX3" fmla="*/ 29182 w 1719014"/>
+              <a:gd name="connsiteY3" fmla="*/ 476039 h 1453501"/>
+              <a:gd name="connsiteX4" fmla="*/ 123775 w 1719014"/>
+              <a:gd name="connsiteY4" fmla="*/ 586398 h 1453501"/>
+            </a:gdLst>
+            <a:ahLst/>
+            <a:cxnLst>
+              <a:cxn ang="0">
+                <a:pos x="connsiteX0" y="connsiteY0"/>
+              </a:cxn>
+              <a:cxn ang="0">
+                <a:pos x="connsiteX1" y="connsiteY1"/>
+              </a:cxn>
+              <a:cxn ang="0">
+                <a:pos x="connsiteX2" y="connsiteY2"/>
+              </a:cxn>
+              <a:cxn ang="0">
+                <a:pos x="connsiteX3" y="connsiteY3"/>
+              </a:cxn>
+              <a:cxn ang="0">
+                <a:pos x="connsiteX4" y="connsiteY4"/>
+              </a:cxn>
+            </a:cxnLst>
+            <a:rect l="l" t="t" r="r" b="b"/>
+            <a:pathLst>
+              <a:path w="1719014" h="1453501">
+                <a:moveTo>
+                  <a:pt x="659803" y="1453501"/>
+                </a:moveTo>
+                <a:cubicBezTo>
+                  <a:pt x="1164300" y="1014694"/>
+                  <a:pt x="1668797" y="575887"/>
+                  <a:pt x="1716093" y="334149"/>
+                </a:cubicBezTo>
+                <a:cubicBezTo>
+                  <a:pt x="1763389" y="92411"/>
+                  <a:pt x="1224734" y="-20574"/>
+                  <a:pt x="943582" y="3074"/>
+                </a:cubicBezTo>
+                <a:cubicBezTo>
+                  <a:pt x="662430" y="26722"/>
+                  <a:pt x="165816" y="378818"/>
+                  <a:pt x="29182" y="476039"/>
+                </a:cubicBezTo>
+                <a:cubicBezTo>
+                  <a:pt x="-107453" y="573260"/>
+                  <a:pt x="289313" y="528591"/>
+                  <a:pt x="123775" y="586398"/>
+                </a:cubicBezTo>
+              </a:path>
+            </a:pathLst>
+          </a:custGeom>
+          <a:noFill/>
+        </p:spPr>
+        <p:style>
+          <a:lnRef idx="1">
+            <a:schemeClr val="accent4"/>
+          </a:lnRef>
+          <a:fillRef idx="2">
+            <a:schemeClr val="accent4"/>
+          </a:fillRef>
+          <a:effectRef idx="1">
+            <a:schemeClr val="accent4"/>
+          </a:effectRef>
+          <a:fontRef idx="minor">
+            <a:schemeClr val="dk1"/>
+          </a:fontRef>
+        </p:style>
+        <p:txBody>
+          <a:bodyPr rtlCol="0" anchor="ctr"/>
+          <a:lstStyle/>
+          <a:p>
+            <a:pPr algn="ctr"/>
+            <a:endParaRPr lang="es-EC"/>
+          </a:p>
+        </p:txBody>
+      </p:sp>
+      <p:cxnSp>
+        <p:nvCxnSpPr>
+          <p:cNvPr id="25" name="Conector recto 24"/>
+          <p:cNvCxnSpPr>
+            <a:stCxn id="23" idx="3"/>
+          </p:cNvCxnSpPr>
+          <p:nvPr/>
+        </p:nvCxnSpPr>
+        <p:spPr>
+          <a:xfrm flipH="1" flipV="1">
+            <a:off x="11101273" y="7173310"/>
+            <a:ext cx="29182" cy="204952"/>
+          </a:xfrm>
+          <a:prstGeom prst="line">
+            <a:avLst/>
+          </a:prstGeom>
+        </p:spPr>
+        <p:style>
+          <a:lnRef idx="3">
+            <a:schemeClr val="accent4"/>
+          </a:lnRef>
+          <a:fillRef idx="0">
+            <a:schemeClr val="accent4"/>
+          </a:fillRef>
+          <a:effectRef idx="2">
+            <a:schemeClr val="accent4"/>
+          </a:effectRef>
+          <a:fontRef idx="minor">
+            <a:schemeClr val="tx1"/>
+          </a:fontRef>
+        </p:style>
+      </p:cxnSp>
+      <p:cxnSp>
+        <p:nvCxnSpPr>
+          <p:cNvPr id="27" name="Conector recto 26"/>
+          <p:cNvCxnSpPr>
+            <a:stCxn id="23" idx="3"/>
+          </p:cNvCxnSpPr>
+          <p:nvPr/>
+        </p:nvCxnSpPr>
+        <p:spPr>
+          <a:xfrm flipV="1">
+            <a:off x="11130455" y="7358727"/>
+            <a:ext cx="299545" cy="19535"/>
+          </a:xfrm>
+          <a:prstGeom prst="line">
+            <a:avLst/>
+          </a:prstGeom>
+        </p:spPr>
+        <p:style>
+          <a:lnRef idx="3">
+            <a:schemeClr val="accent4"/>
+          </a:lnRef>
+          <a:fillRef idx="0">
+            <a:schemeClr val="accent4"/>
+          </a:fillRef>
+          <a:effectRef idx="2">
+            <a:schemeClr val="accent4"/>
+          </a:effectRef>
+          <a:fontRef idx="minor">
+            <a:schemeClr val="tx1"/>
+          </a:fontRef>
+        </p:style>
+      </p:cxnSp>
+      <p:sp>
+        <p:nvSpPr>
+          <p:cNvPr id="51" name="Elipse 50"/>
+          <p:cNvSpPr/>
+          <p:nvPr/>
+        </p:nvSpPr>
+        <p:spPr>
+          <a:xfrm>
+            <a:off x="11280227" y="9698389"/>
+            <a:ext cx="2593428" cy="1975196"/>
+          </a:xfrm>
+          <a:prstGeom prst="ellipse">
+            <a:avLst/>
+          </a:prstGeom>
+        </p:spPr>
+        <p:style>
+          <a:lnRef idx="1">
+            <a:schemeClr val="accent4"/>
+          </a:lnRef>
+          <a:fillRef idx="2">
+            <a:schemeClr val="accent4"/>
+          </a:fillRef>
+          <a:effectRef idx="1">
+            <a:schemeClr val="accent4"/>
+          </a:effectRef>
+          <a:fontRef idx="minor">
+            <a:schemeClr val="dk1"/>
+          </a:fontRef>
+        </p:style>
+        <p:txBody>
+          <a:bodyPr rtlCol="0" anchor="ctr"/>
+          <a:lstStyle/>
+          <a:p>
+            <a:pPr algn="ctr"/>
+            <a:r>
+              <a:rPr lang="es-EC" dirty="0" smtClean="0"/>
+              <a:t>Factor de Normalización</a:t>
+            </a:r>
+            <a:endParaRPr lang="es-EC" dirty="0"/>
+          </a:p>
+        </p:txBody>
+      </p:sp>
+      <p:cxnSp>
+        <p:nvCxnSpPr>
+          <p:cNvPr id="55" name="Conector curvado 54"/>
+          <p:cNvCxnSpPr>
+            <a:endCxn id="51" idx="0"/>
+          </p:cNvCxnSpPr>
+          <p:nvPr/>
+        </p:nvCxnSpPr>
+        <p:spPr>
+          <a:xfrm>
+            <a:off x="11445765" y="8989200"/>
+            <a:ext cx="1131176" cy="709189"/>
+          </a:xfrm>
+          <a:prstGeom prst="curvedConnector2">
+            <a:avLst/>
+          </a:prstGeom>
+          <a:ln>
+            <a:tailEnd type="triangle"/>
+          </a:ln>
+        </p:spPr>
+        <p:style>
+          <a:lnRef idx="3">
+            <a:schemeClr val="accent4"/>
+          </a:lnRef>
+          <a:fillRef idx="0">
+            <a:schemeClr val="accent4"/>
+          </a:fillRef>
+          <a:effectRef idx="2">
+            <a:schemeClr val="accent4"/>
+          </a:effectRef>
+          <a:fontRef idx="minor">
+            <a:schemeClr val="tx1"/>
+          </a:fontRef>
+        </p:style>
+      </p:cxnSp>
+      <p:sp>
+        <p:nvSpPr>
+          <p:cNvPr id="57" name="Elipse 56"/>
+          <p:cNvSpPr/>
+          <p:nvPr/>
+        </p:nvSpPr>
+        <p:spPr>
+          <a:xfrm>
+            <a:off x="9295743" y="12048187"/>
+            <a:ext cx="2488700" cy="1975196"/>
+          </a:xfrm>
+          <a:prstGeom prst="ellipse">
+            <a:avLst/>
+          </a:prstGeom>
+        </p:spPr>
+        <p:style>
+          <a:lnRef idx="1">
+            <a:schemeClr val="accent4"/>
+          </a:lnRef>
+          <a:fillRef idx="2">
+            <a:schemeClr val="accent4"/>
+          </a:fillRef>
+          <a:effectRef idx="1">
+            <a:schemeClr val="accent4"/>
+          </a:effectRef>
+          <a:fontRef idx="minor">
+            <a:schemeClr val="dk1"/>
+          </a:fontRef>
+        </p:style>
+        <p:txBody>
+          <a:bodyPr rtlCol="0" anchor="ctr"/>
+          <a:lstStyle/>
+          <a:p>
+            <a:pPr algn="ctr"/>
+            <a:r>
+              <a:rPr lang="es-EC" dirty="0" smtClean="0"/>
+              <a:t>Momentos de HU en el imagen</a:t>
+            </a:r>
+            <a:endParaRPr lang="es-EC" dirty="0"/>
+          </a:p>
+        </p:txBody>
+      </p:sp>
+      <p:cxnSp>
+        <p:nvCxnSpPr>
+          <p:cNvPr id="58" name="Conector curvado 57"/>
+          <p:cNvCxnSpPr/>
+          <p:nvPr/>
+        </p:nvCxnSpPr>
+        <p:spPr>
+          <a:xfrm rot="5400000">
+            <a:off x="11397942" y="11602149"/>
+            <a:ext cx="711247" cy="615599"/>
+          </a:xfrm>
+          <a:prstGeom prst="curvedConnector3">
+            <a:avLst>
+              <a:gd name="adj1" fmla="val 76600"/>
+            </a:avLst>
+          </a:prstGeom>
+          <a:ln>
+            <a:tailEnd type="triangle"/>
+          </a:ln>
+        </p:spPr>
+        <p:style>
+          <a:lnRef idx="3">
+            <a:schemeClr val="accent4"/>
+          </a:lnRef>
+          <a:fillRef idx="0">
+            <a:schemeClr val="accent4"/>
+          </a:fillRef>
+          <a:effectRef idx="2">
+            <a:schemeClr val="accent4"/>
+          </a:effectRef>
+          <a:fontRef idx="minor">
+            <a:schemeClr val="tx1"/>
+          </a:fontRef>
+        </p:style>
+      </p:cxnSp>
+      <p:sp>
+        <p:nvSpPr>
+          <p:cNvPr id="61" name="Elipse 60"/>
+          <p:cNvSpPr/>
+          <p:nvPr/>
+        </p:nvSpPr>
+        <p:spPr>
+          <a:xfrm>
+            <a:off x="5370360" y="12048187"/>
+            <a:ext cx="2488700" cy="1975196"/>
+          </a:xfrm>
+          <a:prstGeom prst="ellipse">
+            <a:avLst/>
+          </a:prstGeom>
+        </p:spPr>
+        <p:style>
+          <a:lnRef idx="1">
+            <a:schemeClr val="accent4"/>
+          </a:lnRef>
+          <a:fillRef idx="2">
+            <a:schemeClr val="accent4"/>
+          </a:fillRef>
+          <a:effectRef idx="1">
+            <a:schemeClr val="accent4"/>
+          </a:effectRef>
+          <a:fontRef idx="minor">
+            <a:schemeClr val="dk1"/>
+          </a:fontRef>
+        </p:style>
+        <p:txBody>
+          <a:bodyPr rtlCol="0" anchor="ctr"/>
+          <a:lstStyle/>
+          <a:p>
+            <a:pPr algn="ctr"/>
+            <a:r>
+              <a:rPr lang="es-EC" dirty="0" smtClean="0"/>
+              <a:t>Cálculo de distancia/ comparación con TH-BB</a:t>
+            </a:r>
+            <a:endParaRPr lang="es-EC" dirty="0"/>
+          </a:p>
+        </p:txBody>
+      </p:sp>
+      <p:cxnSp>
+        <p:nvCxnSpPr>
+          <p:cNvPr id="49" name="Conector recto de flecha 48"/>
+          <p:cNvCxnSpPr>
+            <a:stCxn id="57" idx="2"/>
+            <a:endCxn id="61" idx="6"/>
+          </p:cNvCxnSpPr>
+          <p:nvPr/>
+        </p:nvCxnSpPr>
+        <p:spPr>
+          <a:xfrm flipH="1">
+            <a:off x="7859060" y="13035785"/>
+            <a:ext cx="1436683" cy="0"/>
+          </a:xfrm>
+          <a:prstGeom prst="straightConnector1">
+            <a:avLst/>
+          </a:prstGeom>
+          <a:ln>
+            <a:tailEnd type="triangle"/>
+          </a:ln>
+        </p:spPr>
+        <p:style>
+          <a:lnRef idx="3">
+            <a:schemeClr val="accent4"/>
+          </a:lnRef>
+          <a:fillRef idx="0">
+            <a:schemeClr val="accent4"/>
+          </a:fillRef>
+          <a:effectRef idx="2">
+            <a:schemeClr val="accent4"/>
+          </a:effectRef>
+          <a:fontRef idx="minor">
+            <a:schemeClr val="tx1"/>
+          </a:fontRef>
+        </p:style>
+      </p:cxnSp>
+      <p:cxnSp>
+        <p:nvCxnSpPr>
+          <p:cNvPr id="65" name="Conector curvado 64"/>
+          <p:cNvCxnSpPr>
+            <a:stCxn id="61" idx="0"/>
+            <a:endCxn id="57" idx="0"/>
+          </p:cNvCxnSpPr>
+          <p:nvPr/>
+        </p:nvCxnSpPr>
+        <p:spPr>
+          <a:xfrm rot="5400000" flipH="1" flipV="1">
+            <a:off x="8577401" y="10085496"/>
+            <a:ext cx="12700" cy="3925383"/>
+          </a:xfrm>
+          <a:prstGeom prst="curvedConnector3">
+            <a:avLst>
+              <a:gd name="adj1" fmla="val 7510339"/>
+            </a:avLst>
+          </a:prstGeom>
+          <a:ln>
+            <a:tailEnd type="triangle"/>
+          </a:ln>
+        </p:spPr>
+        <p:style>
+          <a:lnRef idx="3">
+            <a:schemeClr val="accent4"/>
+          </a:lnRef>
+          <a:fillRef idx="0">
+            <a:schemeClr val="accent4"/>
+          </a:fillRef>
+          <a:effectRef idx="2">
+            <a:schemeClr val="accent4"/>
+          </a:effectRef>
+          <a:fontRef idx="minor">
+            <a:schemeClr val="tx1"/>
+          </a:fontRef>
+        </p:style>
+      </p:cxnSp>
+      <p:sp>
+        <p:nvSpPr>
+          <p:cNvPr id="67" name="Elipse 66"/>
+          <p:cNvSpPr/>
+          <p:nvPr/>
+        </p:nvSpPr>
+        <p:spPr>
+          <a:xfrm>
+            <a:off x="2164705" y="9220904"/>
+            <a:ext cx="2488700" cy="1975196"/>
+          </a:xfrm>
+          <a:prstGeom prst="ellipse">
+            <a:avLst/>
+          </a:prstGeom>
+        </p:spPr>
+        <p:style>
+          <a:lnRef idx="1">
+            <a:schemeClr val="accent4"/>
+          </a:lnRef>
+          <a:fillRef idx="2">
+            <a:schemeClr val="accent4"/>
+          </a:fillRef>
+          <a:effectRef idx="1">
+            <a:schemeClr val="accent4"/>
+          </a:effectRef>
+          <a:fontRef idx="minor">
+            <a:schemeClr val="dk1"/>
+          </a:fontRef>
+        </p:style>
+        <p:txBody>
+          <a:bodyPr rtlCol="0" anchor="ctr"/>
+          <a:lstStyle/>
+          <a:p>
+            <a:pPr algn="ctr"/>
+            <a:r>
+              <a:rPr lang="es-EC" dirty="0" smtClean="0"/>
+              <a:t>Display</a:t>
+            </a:r>
+            <a:endParaRPr lang="es-EC" dirty="0"/>
+          </a:p>
+        </p:txBody>
+      </p:sp>
+      <p:cxnSp>
+        <p:nvCxnSpPr>
+          <p:cNvPr id="69" name="Conector curvado 68"/>
+          <p:cNvCxnSpPr>
+            <a:stCxn id="61" idx="2"/>
+          </p:cNvCxnSpPr>
+          <p:nvPr/>
+        </p:nvCxnSpPr>
+        <p:spPr>
+          <a:xfrm rot="10800000">
+            <a:off x="3783724" y="11196101"/>
+            <a:ext cx="1586636" cy="1839685"/>
+          </a:xfrm>
+          <a:prstGeom prst="curvedConnector2">
+            <a:avLst/>
+          </a:prstGeom>
+          <a:ln>
+            <a:tailEnd type="triangle"/>
+          </a:ln>
+        </p:spPr>
+        <p:style>
+          <a:lnRef idx="3">
+            <a:schemeClr val="accent4"/>
+          </a:lnRef>
+          <a:fillRef idx="0">
+            <a:schemeClr val="accent4"/>
+          </a:fillRef>
+          <a:effectRef idx="2">
+            <a:schemeClr val="accent4"/>
+          </a:effectRef>
+          <a:fontRef idx="minor">
+            <a:schemeClr val="tx1"/>
+          </a:fontRef>
+        </p:style>
+      </p:cxnSp>
+      <p:sp>
+        <p:nvSpPr>
+          <p:cNvPr id="70" name="CuadroTexto 69"/>
+          <p:cNvSpPr txBox="1"/>
+          <p:nvPr/>
+        </p:nvSpPr>
+        <p:spPr>
+          <a:xfrm>
+            <a:off x="8119241" y="11792607"/>
+            <a:ext cx="410690" cy="369332"/>
+          </a:xfrm>
+          <a:prstGeom prst="rect">
+            <a:avLst/>
+          </a:prstGeom>
+          <a:noFill/>
+        </p:spPr>
+        <p:txBody>
+          <a:bodyPr wrap="none" rtlCol="0">
+            <a:spAutoFit/>
+          </a:bodyPr>
+          <a:lstStyle/>
+          <a:p>
+            <a:r>
+              <a:rPr lang="es-EC" dirty="0" smtClean="0"/>
+              <a:t>1*</a:t>
+            </a:r>
+            <a:endParaRPr lang="es-EC" dirty="0"/>
+          </a:p>
+        </p:txBody>
+      </p:sp>
+      <p:sp>
+        <p:nvSpPr>
+          <p:cNvPr id="71" name="CuadroTexto 70"/>
+          <p:cNvSpPr txBox="1"/>
+          <p:nvPr/>
+        </p:nvSpPr>
+        <p:spPr>
+          <a:xfrm>
+            <a:off x="2164705" y="15434441"/>
+            <a:ext cx="7499169" cy="369332"/>
+          </a:xfrm>
+          <a:prstGeom prst="rect">
+            <a:avLst/>
+          </a:prstGeom>
+          <a:noFill/>
+        </p:spPr>
+        <p:txBody>
+          <a:bodyPr wrap="none" rtlCol="0">
+            <a:spAutoFit/>
+          </a:bodyPr>
+          <a:lstStyle/>
+          <a:p>
+            <a:r>
+              <a:rPr lang="es-EC" dirty="0" smtClean="0"/>
+              <a:t>1* Por cada pixel de la imagen de prueba se realiza la repetición</a:t>
+            </a:r>
+            <a:endParaRPr lang="es-EC" dirty="0"/>
+          </a:p>
+        </p:txBody>
+      </p:sp>
+      <p:sp>
+        <p:nvSpPr>
+          <p:cNvPr id="72" name="CuadroTexto 71"/>
+          <p:cNvSpPr txBox="1"/>
+          <p:nvPr/>
+        </p:nvSpPr>
+        <p:spPr>
+          <a:xfrm>
+            <a:off x="10294883" y="13652938"/>
+            <a:ext cx="410690" cy="369332"/>
+          </a:xfrm>
+          <a:prstGeom prst="rect">
+            <a:avLst/>
+          </a:prstGeom>
+          <a:noFill/>
+        </p:spPr>
+        <p:txBody>
+          <a:bodyPr wrap="none" rtlCol="0">
+            <a:spAutoFit/>
+          </a:bodyPr>
+          <a:lstStyle/>
+          <a:p>
+            <a:r>
+              <a:rPr lang="es-EC" dirty="0" smtClean="0">
+                <a:solidFill>
+                  <a:schemeClr val="bg1"/>
+                </a:solidFill>
+              </a:rPr>
+              <a:t>2*</a:t>
+            </a:r>
+            <a:endParaRPr lang="es-EC" dirty="0">
+              <a:solidFill>
+                <a:schemeClr val="bg1"/>
+              </a:solidFill>
+            </a:endParaRPr>
+          </a:p>
+        </p:txBody>
+      </p:sp>
+      <p:sp>
+        <p:nvSpPr>
+          <p:cNvPr id="73" name="CuadroTexto 72"/>
+          <p:cNvSpPr txBox="1"/>
+          <p:nvPr/>
+        </p:nvSpPr>
+        <p:spPr>
+          <a:xfrm>
+            <a:off x="10334748" y="8619868"/>
+            <a:ext cx="410690" cy="369332"/>
+          </a:xfrm>
+          <a:prstGeom prst="rect">
+            <a:avLst/>
+          </a:prstGeom>
+          <a:noFill/>
+        </p:spPr>
+        <p:txBody>
+          <a:bodyPr wrap="none" rtlCol="0">
+            <a:spAutoFit/>
+          </a:bodyPr>
+          <a:lstStyle/>
+          <a:p>
+            <a:r>
+              <a:rPr lang="es-EC" dirty="0" smtClean="0">
+                <a:solidFill>
+                  <a:schemeClr val="bg1"/>
+                </a:solidFill>
+              </a:rPr>
+              <a:t>2*</a:t>
+            </a:r>
+            <a:endParaRPr lang="es-EC" dirty="0">
+              <a:solidFill>
+                <a:schemeClr val="bg1"/>
+              </a:solidFill>
+            </a:endParaRPr>
+          </a:p>
+        </p:txBody>
+      </p:sp>
+      <p:sp>
+        <p:nvSpPr>
+          <p:cNvPr id="74" name="CuadroTexto 73"/>
+          <p:cNvSpPr txBox="1"/>
+          <p:nvPr/>
+        </p:nvSpPr>
+        <p:spPr>
+          <a:xfrm>
+            <a:off x="2164705" y="16128124"/>
+            <a:ext cx="9595897" cy="369332"/>
+          </a:xfrm>
+          <a:prstGeom prst="rect">
+            <a:avLst/>
+          </a:prstGeom>
+          <a:noFill/>
+        </p:spPr>
+        <p:txBody>
+          <a:bodyPr wrap="none" rtlCol="0">
+            <a:spAutoFit/>
+          </a:bodyPr>
+          <a:lstStyle/>
+          <a:p>
+            <a:r>
+              <a:rPr lang="es-EC" dirty="0" smtClean="0"/>
+              <a:t>2* Este estado implementa a la FSM encargada del cálculo de los momentos de HU</a:t>
+            </a:r>
+            <a:endParaRPr lang="es-EC" dirty="0"/>
+          </a:p>
+        </p:txBody>
+      </p:sp>
+    </p:spTree>
+    <p:extLst>
+      <p:ext uri="{BB962C8B-B14F-4D97-AF65-F5344CB8AC3E}">
+        <p14:creationId xmlns:p14="http://schemas.microsoft.com/office/powerpoint/2010/main" val="4063228156"/>
       </p:ext>
     </p:extLst>
   </p:cSld>

</xml_diff>